<commit_message>
Changes in the competition PPT
</commit_message>
<xml_diff>
--- a/PPT Competition edited.pptx
+++ b/PPT Competition edited.pptx
@@ -280,7 +280,7 @@
       <p15:sldGuideLst xmlns:p15="http://schemas.microsoft.com/office/powerpoint/2012/main"/>
     </p:ext>
     <p:ext uri="GoogleSlidesCustomDataVersion2">
-      <go:slidesCustomData xmlns:go="http://customooxmlschemas.google.com/" xmlns:ahyp="http://schemas.microsoft.com/office/drawing/2018/hyperlinkcolor" xmlns:p15="http://schemas.microsoft.com/office/powerpoint/2012/main" xmlns:p14="http://schemas.microsoft.com/office/powerpoint/2010/main" xmlns:com="http://schemas.openxmlformats.org/drawingml/2006/compatibility" xmlns:pvml="urn:schemas-microsoft-com:office:powerpoint" xmlns:v="urn:schemas-microsoft-com:vml" xmlns:o="urn:schemas-microsoft-com:office:office" xmlns:dgm="http://schemas.openxmlformats.org/drawingml/2006/diagram" xmlns:c="http://schemas.openxmlformats.org/drawingml/2006/chart" xmlns:mv="urn:schemas-microsoft-com:mac:vml" xmlns:mc="http://schemas.openxmlformats.org/markup-compatibility/2006" xmlns="" r:id="rId31" roundtripDataSignature="AMtx7mg3cm7Xvjkc6U0sK+jP/1ydJjPYVw=="/>
+      <go:slidesCustomData xmlns="" xmlns:mc="http://schemas.openxmlformats.org/markup-compatibility/2006" xmlns:mv="urn:schemas-microsoft-com:mac:vml" xmlns:c="http://schemas.openxmlformats.org/drawingml/2006/chart" xmlns:dgm="http://schemas.openxmlformats.org/drawingml/2006/diagram" xmlns:o="urn:schemas-microsoft-com:office:office" xmlns:v="urn:schemas-microsoft-com:vml" xmlns:pvml="urn:schemas-microsoft-com:office:powerpoint" xmlns:com="http://schemas.openxmlformats.org/drawingml/2006/compatibility" xmlns:p14="http://schemas.microsoft.com/office/powerpoint/2010/main" xmlns:p15="http://schemas.microsoft.com/office/powerpoint/2012/main" xmlns:ahyp="http://schemas.microsoft.com/office/drawing/2018/hyperlinkcolor" xmlns:go="http://customooxmlschemas.google.com/" r:id="rId31" roundtripDataSignature="AMtx7mg3cm7Xvjkc6U0sK+jP/1ydJjPYVw=="/>
     </p:ext>
   </p:extLst>
 </p:presentation>
@@ -296,6 +296,194 @@
     </p:extLst>
   </p:cmAuthor>
 </p:cmAuthorLst>
+</file>
+
+<file path=ppt/changesInfos/changesInfo1.xml><?xml version="1.0" encoding="utf-8"?>
+<pc:chgInfo xmlns:a="http://schemas.openxmlformats.org/drawingml/2006/main" xmlns:r="http://schemas.openxmlformats.org/officeDocument/2006/relationships" xmlns:ac="http://schemas.microsoft.com/office/drawing/2013/main/command" xmlns:pc="http://schemas.microsoft.com/office/powerpoint/2013/main/command">
+  <pc:docChgLst>
+    <pc:chgData name="Vaibhav Nrupnarayan" userId="2367d97497f38afe" providerId="LiveId" clId="{FB1E8A90-0B55-4DFB-B0E4-7B0ED8C5964C}"/>
+    <pc:docChg chg="undo custSel modSld">
+      <pc:chgData name="Vaibhav Nrupnarayan" userId="2367d97497f38afe" providerId="LiveId" clId="{FB1E8A90-0B55-4DFB-B0E4-7B0ED8C5964C}" dt="2024-08-24T04:55:24.237" v="120" actId="20577"/>
+      <pc:docMkLst>
+        <pc:docMk/>
+      </pc:docMkLst>
+      <pc:sldChg chg="addSp delSp modSp mod">
+        <pc:chgData name="Vaibhav Nrupnarayan" userId="2367d97497f38afe" providerId="LiveId" clId="{FB1E8A90-0B55-4DFB-B0E4-7B0ED8C5964C}" dt="2024-08-24T04:55:24.237" v="120" actId="20577"/>
+        <pc:sldMkLst>
+          <pc:docMk/>
+          <pc:sldMk cId="0" sldId="265"/>
+        </pc:sldMkLst>
+        <pc:spChg chg="mod">
+          <ac:chgData name="Vaibhav Nrupnarayan" userId="2367d97497f38afe" providerId="LiveId" clId="{FB1E8A90-0B55-4DFB-B0E4-7B0ED8C5964C}" dt="2024-08-24T04:55:24.237" v="120" actId="20577"/>
+          <ac:spMkLst>
+            <pc:docMk/>
+            <pc:sldMk cId="0" sldId="265"/>
+            <ac:spMk id="3" creationId="{03481D8E-B8F9-A982-F167-5D785BFE8767}"/>
+          </ac:spMkLst>
+        </pc:spChg>
+        <pc:spChg chg="add del">
+          <ac:chgData name="Vaibhav Nrupnarayan" userId="2367d97497f38afe" providerId="LiveId" clId="{FB1E8A90-0B55-4DFB-B0E4-7B0ED8C5964C}" dt="2024-08-24T04:46:37.746" v="40" actId="478"/>
+          <ac:spMkLst>
+            <pc:docMk/>
+            <pc:sldMk cId="0" sldId="265"/>
+            <ac:spMk id="5" creationId="{01900121-69B9-8636-62AE-5A825D047FCF}"/>
+          </ac:spMkLst>
+        </pc:spChg>
+        <pc:spChg chg="add del mod">
+          <ac:chgData name="Vaibhav Nrupnarayan" userId="2367d97497f38afe" providerId="LiveId" clId="{FB1E8A90-0B55-4DFB-B0E4-7B0ED8C5964C}" dt="2024-08-24T04:47:03.591" v="44" actId="478"/>
+          <ac:spMkLst>
+            <pc:docMk/>
+            <pc:sldMk cId="0" sldId="265"/>
+            <ac:spMk id="7" creationId="{5C50A8EB-DEB7-B547-DF8C-CFE1D6E003EC}"/>
+          </ac:spMkLst>
+        </pc:spChg>
+        <pc:spChg chg="add mod">
+          <ac:chgData name="Vaibhav Nrupnarayan" userId="2367d97497f38afe" providerId="LiveId" clId="{FB1E8A90-0B55-4DFB-B0E4-7B0ED8C5964C}" dt="2024-08-24T04:48:19.277" v="66" actId="14100"/>
+          <ac:spMkLst>
+            <pc:docMk/>
+            <pc:sldMk cId="0" sldId="265"/>
+            <ac:spMk id="8" creationId="{6C98F0B1-E5DC-8451-6127-0451E76A9867}"/>
+          </ac:spMkLst>
+        </pc:spChg>
+        <pc:spChg chg="add mod">
+          <ac:chgData name="Vaibhav Nrupnarayan" userId="2367d97497f38afe" providerId="LiveId" clId="{FB1E8A90-0B55-4DFB-B0E4-7B0ED8C5964C}" dt="2024-08-24T04:48:08.595" v="64" actId="1076"/>
+          <ac:spMkLst>
+            <pc:docMk/>
+            <pc:sldMk cId="0" sldId="265"/>
+            <ac:spMk id="9" creationId="{FD35EB00-160A-A08F-EAA4-2226DB3236D7}"/>
+          </ac:spMkLst>
+        </pc:spChg>
+        <pc:spChg chg="del">
+          <ac:chgData name="Vaibhav Nrupnarayan" userId="2367d97497f38afe" providerId="LiveId" clId="{FB1E8A90-0B55-4DFB-B0E4-7B0ED8C5964C}" dt="2024-08-24T04:52:50.632" v="75" actId="21"/>
+          <ac:spMkLst>
+            <pc:docMk/>
+            <pc:sldMk cId="0" sldId="265"/>
+            <ac:spMk id="10" creationId="{36AE9F9A-A4A8-2204-1BFC-3B57B6CC0E5F}"/>
+          </ac:spMkLst>
+        </pc:spChg>
+        <pc:spChg chg="add mod">
+          <ac:chgData name="Vaibhav Nrupnarayan" userId="2367d97497f38afe" providerId="LiveId" clId="{FB1E8A90-0B55-4DFB-B0E4-7B0ED8C5964C}" dt="2024-08-24T04:54:38.635" v="114" actId="1076"/>
+          <ac:spMkLst>
+            <pc:docMk/>
+            <pc:sldMk cId="0" sldId="265"/>
+            <ac:spMk id="11" creationId="{36AE9F9A-A4A8-2204-1BFC-3B57B6CC0E5F}"/>
+          </ac:spMkLst>
+        </pc:spChg>
+        <pc:spChg chg="mod">
+          <ac:chgData name="Vaibhav Nrupnarayan" userId="2367d97497f38afe" providerId="LiveId" clId="{FB1E8A90-0B55-4DFB-B0E4-7B0ED8C5964C}" dt="2024-08-24T04:53:14.419" v="78" actId="1076"/>
+          <ac:spMkLst>
+            <pc:docMk/>
+            <pc:sldMk cId="0" sldId="265"/>
+            <ac:spMk id="12" creationId="{28EA788F-56E3-83AF-C607-EBB04F13AA06}"/>
+          </ac:spMkLst>
+        </pc:spChg>
+        <pc:spChg chg="add mod">
+          <ac:chgData name="Vaibhav Nrupnarayan" userId="2367d97497f38afe" providerId="LiveId" clId="{FB1E8A90-0B55-4DFB-B0E4-7B0ED8C5964C}" dt="2024-08-24T04:54:29.730" v="112" actId="1076"/>
+          <ac:spMkLst>
+            <pc:docMk/>
+            <pc:sldMk cId="0" sldId="265"/>
+            <ac:spMk id="13" creationId="{A2CE0515-DABB-AE11-2397-14604D0CA3C8}"/>
+          </ac:spMkLst>
+        </pc:spChg>
+        <pc:spChg chg="add mod">
+          <ac:chgData name="Vaibhav Nrupnarayan" userId="2367d97497f38afe" providerId="LiveId" clId="{FB1E8A90-0B55-4DFB-B0E4-7B0ED8C5964C}" dt="2024-08-24T04:54:47.834" v="117" actId="14100"/>
+          <ac:spMkLst>
+            <pc:docMk/>
+            <pc:sldMk cId="0" sldId="265"/>
+            <ac:spMk id="16" creationId="{03909E62-7F4C-0820-1284-A1F14E3AADE0}"/>
+          </ac:spMkLst>
+        </pc:spChg>
+        <pc:spChg chg="del">
+          <ac:chgData name="Vaibhav Nrupnarayan" userId="2367d97497f38afe" providerId="LiveId" clId="{FB1E8A90-0B55-4DFB-B0E4-7B0ED8C5964C}" dt="2024-08-24T04:46:20.464" v="37" actId="478"/>
+          <ac:spMkLst>
+            <pc:docMk/>
+            <pc:sldMk cId="0" sldId="265"/>
+            <ac:spMk id="18" creationId="{CF2D3456-6FB2-4380-FEA9-DE6D0AA48CF9}"/>
+          </ac:spMkLst>
+        </pc:spChg>
+        <pc:spChg chg="del">
+          <ac:chgData name="Vaibhav Nrupnarayan" userId="2367d97497f38afe" providerId="LiveId" clId="{FB1E8A90-0B55-4DFB-B0E4-7B0ED8C5964C}" dt="2024-08-24T04:46:21.230" v="38" actId="478"/>
+          <ac:spMkLst>
+            <pc:docMk/>
+            <pc:sldMk cId="0" sldId="265"/>
+            <ac:spMk id="20" creationId="{8699FBEB-823E-99BE-CEC5-4D80857BF181}"/>
+          </ac:spMkLst>
+        </pc:spChg>
+        <pc:spChg chg="mod">
+          <ac:chgData name="Vaibhav Nrupnarayan" userId="2367d97497f38afe" providerId="LiveId" clId="{FB1E8A90-0B55-4DFB-B0E4-7B0ED8C5964C}" dt="2024-08-24T04:54:32.115" v="113" actId="14100"/>
+          <ac:spMkLst>
+            <pc:docMk/>
+            <pc:sldMk cId="0" sldId="265"/>
+            <ac:spMk id="21" creationId="{8B072D66-11D5-AEEC-EB44-DB1A61F20BA7}"/>
+          </ac:spMkLst>
+        </pc:spChg>
+        <pc:spChg chg="mod">
+          <ac:chgData name="Vaibhav Nrupnarayan" userId="2367d97497f38afe" providerId="LiveId" clId="{FB1E8A90-0B55-4DFB-B0E4-7B0ED8C5964C}" dt="2024-08-24T04:53:08.067" v="77" actId="1076"/>
+          <ac:spMkLst>
+            <pc:docMk/>
+            <pc:sldMk cId="0" sldId="265"/>
+            <ac:spMk id="23" creationId="{87EFB2A0-5105-1493-3527-B33FF8129E8A}"/>
+          </ac:spMkLst>
+        </pc:spChg>
+        <pc:spChg chg="del">
+          <ac:chgData name="Vaibhav Nrupnarayan" userId="2367d97497f38afe" providerId="LiveId" clId="{FB1E8A90-0B55-4DFB-B0E4-7B0ED8C5964C}" dt="2024-08-24T04:44:13.823" v="29" actId="478"/>
+          <ac:spMkLst>
+            <pc:docMk/>
+            <pc:sldMk cId="0" sldId="265"/>
+            <ac:spMk id="26" creationId="{981D9C5D-5781-D9E3-7E4E-B0E3E5E8AE88}"/>
+          </ac:spMkLst>
+        </pc:spChg>
+        <pc:spChg chg="mod">
+          <ac:chgData name="Vaibhav Nrupnarayan" userId="2367d97497f38afe" providerId="LiveId" clId="{FB1E8A90-0B55-4DFB-B0E4-7B0ED8C5964C}" dt="2024-08-24T04:53:00.547" v="76" actId="1076"/>
+          <ac:spMkLst>
+            <pc:docMk/>
+            <pc:sldMk cId="0" sldId="265"/>
+            <ac:spMk id="27" creationId="{05F8D8BA-5623-6337-5971-108FD3F30917}"/>
+          </ac:spMkLst>
+        </pc:spChg>
+        <pc:spChg chg="del">
+          <ac:chgData name="Vaibhav Nrupnarayan" userId="2367d97497f38afe" providerId="LiveId" clId="{FB1E8A90-0B55-4DFB-B0E4-7B0ED8C5964C}" dt="2024-08-24T04:46:19.475" v="36" actId="478"/>
+          <ac:spMkLst>
+            <pc:docMk/>
+            <pc:sldMk cId="0" sldId="265"/>
+            <ac:spMk id="28" creationId="{67510878-8976-1189-75FE-AD1404924BC6}"/>
+          </ac:spMkLst>
+        </pc:spChg>
+        <pc:spChg chg="mod">
+          <ac:chgData name="Vaibhav Nrupnarayan" userId="2367d97497f38afe" providerId="LiveId" clId="{FB1E8A90-0B55-4DFB-B0E4-7B0ED8C5964C}" dt="2024-08-24T04:48:01.973" v="62" actId="1076"/>
+          <ac:spMkLst>
+            <pc:docMk/>
+            <pc:sldMk cId="0" sldId="265"/>
+            <ac:spMk id="131" creationId="{00000000-0000-0000-0000-000000000000}"/>
+          </ac:spMkLst>
+        </pc:spChg>
+      </pc:sldChg>
+      <pc:sldChg chg="delSp modSp mod">
+        <pc:chgData name="Vaibhav Nrupnarayan" userId="2367d97497f38afe" providerId="LiveId" clId="{FB1E8A90-0B55-4DFB-B0E4-7B0ED8C5964C}" dt="2024-08-24T04:46:00.147" v="32" actId="478"/>
+        <pc:sldMkLst>
+          <pc:docMk/>
+          <pc:sldMk cId="3177208236" sldId="276"/>
+        </pc:sldMkLst>
+        <pc:spChg chg="del mod">
+          <ac:chgData name="Vaibhav Nrupnarayan" userId="2367d97497f38afe" providerId="LiveId" clId="{FB1E8A90-0B55-4DFB-B0E4-7B0ED8C5964C}" dt="2024-08-24T04:45:59.140" v="31" actId="478"/>
+          <ac:spMkLst>
+            <pc:docMk/>
+            <pc:sldMk cId="3177208236" sldId="276"/>
+            <ac:spMk id="8" creationId="{41255536-48AE-89E1-1B4F-340A1ED5B8C0}"/>
+          </ac:spMkLst>
+        </pc:spChg>
+        <pc:spChg chg="del">
+          <ac:chgData name="Vaibhav Nrupnarayan" userId="2367d97497f38afe" providerId="LiveId" clId="{FB1E8A90-0B55-4DFB-B0E4-7B0ED8C5964C}" dt="2024-08-24T04:46:00.147" v="32" actId="478"/>
+          <ac:spMkLst>
+            <pc:docMk/>
+            <pc:sldMk cId="3177208236" sldId="276"/>
+            <ac:spMk id="13" creationId="{EFC05812-FD6D-029E-F1B4-0680972C9997}"/>
+          </ac:spMkLst>
+        </pc:spChg>
+      </pc:sldChg>
+    </pc:docChg>
+  </pc:docChgLst>
+</pc:chgInfo>
 </file>
 
 <file path=ppt/notesMasters/notesMaster1.xml><?xml version="1.0" encoding="utf-8"?>
@@ -6607,69 +6795,6 @@
       </p:sp>
       <p:sp>
         <p:nvSpPr>
-          <p:cNvPr id="8" name="Rectangle: Rounded Corners 7">
-            <a:extLst>
-              <a:ext uri="{FF2B5EF4-FFF2-40B4-BE49-F238E27FC236}">
-                <a16:creationId xmlns:a16="http://schemas.microsoft.com/office/drawing/2014/main" id="{41255536-48AE-89E1-1B4F-340A1ED5B8C0}"/>
-              </a:ext>
-            </a:extLst>
-          </p:cNvPr>
-          <p:cNvSpPr/>
-          <p:nvPr/>
-        </p:nvSpPr>
-        <p:spPr>
-          <a:xfrm>
-            <a:off x="8936955" y="6020907"/>
-            <a:ext cx="1771650" cy="1055422"/>
-          </a:xfrm>
-          <a:prstGeom prst="roundRect">
-            <a:avLst/>
-          </a:prstGeom>
-        </p:spPr>
-        <p:style>
-          <a:lnRef idx="2">
-            <a:schemeClr val="accent1">
-              <a:shade val="15000"/>
-            </a:schemeClr>
-          </a:lnRef>
-          <a:fillRef idx="1">
-            <a:schemeClr val="accent1"/>
-          </a:fillRef>
-          <a:effectRef idx="0">
-            <a:schemeClr val="accent1"/>
-          </a:effectRef>
-          <a:fontRef idx="minor">
-            <a:schemeClr val="lt1"/>
-          </a:fontRef>
-        </p:style>
-        <p:txBody>
-          <a:bodyPr rtlCol="0" anchor="ctr"/>
-          <a:lstStyle/>
-          <a:p>
-            <a:pPr algn="ctr"/>
-            <a:r>
-              <a:rPr lang="en-US" sz="2000" dirty="0">
-                <a:latin typeface="Times New Roman" panose="02020603050405020304" pitchFamily="18" charset="0"/>
-                <a:cs typeface="Times New Roman" panose="02020603050405020304" pitchFamily="18" charset="0"/>
-              </a:rPr>
-              <a:t>D</a:t>
-            </a:r>
-            <a:r>
-              <a:rPr lang="en-IN" sz="2000" dirty="0" err="1">
-                <a:latin typeface="Times New Roman" panose="02020603050405020304" pitchFamily="18" charset="0"/>
-                <a:cs typeface="Times New Roman" panose="02020603050405020304" pitchFamily="18" charset="0"/>
-              </a:rPr>
-              <a:t>isplay</a:t>
-            </a:r>
-            <a:endParaRPr lang="en-IN" sz="2000" dirty="0">
-              <a:latin typeface="Times New Roman" panose="02020603050405020304" pitchFamily="18" charset="0"/>
-              <a:cs typeface="Times New Roman" panose="02020603050405020304" pitchFamily="18" charset="0"/>
-            </a:endParaRPr>
-          </a:p>
-        </p:txBody>
-      </p:sp>
-      <p:sp>
-        <p:nvSpPr>
           <p:cNvPr id="11" name="Arrow: Left 10">
             <a:extLst>
               <a:ext uri="{FF2B5EF4-FFF2-40B4-BE49-F238E27FC236}">
@@ -6732,52 +6857,6 @@
             <a:ext cx="628778" cy="461298"/>
           </a:xfrm>
           <a:prstGeom prst="downArrow">
-            <a:avLst/>
-          </a:prstGeom>
-        </p:spPr>
-        <p:style>
-          <a:lnRef idx="2">
-            <a:schemeClr val="accent1">
-              <a:shade val="15000"/>
-            </a:schemeClr>
-          </a:lnRef>
-          <a:fillRef idx="1">
-            <a:schemeClr val="accent1"/>
-          </a:fillRef>
-          <a:effectRef idx="0">
-            <a:schemeClr val="accent1"/>
-          </a:effectRef>
-          <a:fontRef idx="minor">
-            <a:schemeClr val="lt1"/>
-          </a:fontRef>
-        </p:style>
-        <p:txBody>
-          <a:bodyPr rtlCol="0" anchor="ctr"/>
-          <a:lstStyle/>
-          <a:p>
-            <a:pPr algn="ctr"/>
-            <a:endParaRPr lang="en-IN"/>
-          </a:p>
-        </p:txBody>
-      </p:sp>
-      <p:sp>
-        <p:nvSpPr>
-          <p:cNvPr id="13" name="Arrow: Up-Down 12">
-            <a:extLst>
-              <a:ext uri="{FF2B5EF4-FFF2-40B4-BE49-F238E27FC236}">
-                <a16:creationId xmlns:a16="http://schemas.microsoft.com/office/drawing/2014/main" id="{EFC05812-FD6D-029E-F1B4-0680972C9997}"/>
-              </a:ext>
-            </a:extLst>
-          </p:cNvPr>
-          <p:cNvSpPr/>
-          <p:nvPr/>
-        </p:nvSpPr>
-        <p:spPr>
-          <a:xfrm>
-            <a:off x="9496728" y="5097038"/>
-            <a:ext cx="484632" cy="875530"/>
-          </a:xfrm>
-          <a:prstGeom prst="upDownArrow">
             <a:avLst/>
           </a:prstGeom>
         </p:spPr>
@@ -6936,7 +7015,7 @@
         </p:nvSpPr>
         <p:spPr>
           <a:xfrm flipH="1">
-            <a:off x="0" y="-3999"/>
+            <a:off x="0" y="-3995"/>
             <a:ext cx="14630400" cy="8229600"/>
           </a:xfrm>
           <a:prstGeom prst="rect">
@@ -7343,7 +7422,7 @@
                 <a:latin typeface="Times New Roman" panose="02020603050405020304" pitchFamily="18" charset="0"/>
                 <a:cs typeface="Times New Roman" panose="02020603050405020304" pitchFamily="18" charset="0"/>
               </a:rPr>
-              <a:t>Image processing</a:t>
+              <a:t>Image preprocessing</a:t>
             </a:r>
           </a:p>
         </p:txBody>
@@ -7402,58 +7481,6 @@
       </p:sp>
       <p:sp>
         <p:nvSpPr>
-          <p:cNvPr id="10" name="Rectangle 9">
-            <a:extLst>
-              <a:ext uri="{FF2B5EF4-FFF2-40B4-BE49-F238E27FC236}">
-                <a16:creationId xmlns:a16="http://schemas.microsoft.com/office/drawing/2014/main" id="{36AE9F9A-A4A8-2204-1BFC-3B57B6CC0E5F}"/>
-              </a:ext>
-            </a:extLst>
-          </p:cNvPr>
-          <p:cNvSpPr/>
-          <p:nvPr/>
-        </p:nvSpPr>
-        <p:spPr>
-          <a:xfrm>
-            <a:off x="11998385" y="5504695"/>
-            <a:ext cx="2253083" cy="886940"/>
-          </a:xfrm>
-          <a:prstGeom prst="rect">
-            <a:avLst/>
-          </a:prstGeom>
-        </p:spPr>
-        <p:style>
-          <a:lnRef idx="2">
-            <a:schemeClr val="accent1">
-              <a:shade val="15000"/>
-            </a:schemeClr>
-          </a:lnRef>
-          <a:fillRef idx="1">
-            <a:schemeClr val="accent1"/>
-          </a:fillRef>
-          <a:effectRef idx="0">
-            <a:schemeClr val="accent1"/>
-          </a:effectRef>
-          <a:fontRef idx="minor">
-            <a:schemeClr val="lt1"/>
-          </a:fontRef>
-        </p:style>
-        <p:txBody>
-          <a:bodyPr rtlCol="0" anchor="ctr"/>
-          <a:lstStyle/>
-          <a:p>
-            <a:pPr algn="ctr"/>
-            <a:r>
-              <a:rPr lang="en-IN" sz="1900" dirty="0">
-                <a:latin typeface="Times New Roman" panose="02020603050405020304" pitchFamily="18" charset="0"/>
-                <a:cs typeface="Times New Roman" panose="02020603050405020304" pitchFamily="18" charset="0"/>
-              </a:rPr>
-              <a:t>Data base</a:t>
-            </a:r>
-          </a:p>
-        </p:txBody>
-      </p:sp>
-      <p:sp>
-        <p:nvSpPr>
           <p:cNvPr id="12" name="Rectangle 11">
             <a:extLst>
               <a:ext uri="{FF2B5EF4-FFF2-40B4-BE49-F238E27FC236}">
@@ -7466,7 +7493,7 @@
         </p:nvSpPr>
         <p:spPr>
           <a:xfrm>
-            <a:off x="11963585" y="7056676"/>
+            <a:off x="11995758" y="7178074"/>
             <a:ext cx="2320791" cy="846843"/>
           </a:xfrm>
           <a:prstGeom prst="rect">
@@ -7499,7 +7526,7 @@
                 <a:latin typeface="Times New Roman" panose="02020603050405020304" pitchFamily="18" charset="0"/>
                 <a:cs typeface="Times New Roman" panose="02020603050405020304" pitchFamily="18" charset="0"/>
               </a:rPr>
-              <a:t>Display output</a:t>
+              <a:t>Display output on the laptop screen</a:t>
             </a:r>
           </a:p>
         </p:txBody>
@@ -7598,98 +7625,6 @@
       </p:sp>
       <p:sp>
         <p:nvSpPr>
-          <p:cNvPr id="18" name="Arrow: Left-Up 17">
-            <a:extLst>
-              <a:ext uri="{FF2B5EF4-FFF2-40B4-BE49-F238E27FC236}">
-                <a16:creationId xmlns:a16="http://schemas.microsoft.com/office/drawing/2014/main" id="{CF2D3456-6FB2-4380-FEA9-DE6D0AA48CF9}"/>
-              </a:ext>
-            </a:extLst>
-          </p:cNvPr>
-          <p:cNvSpPr/>
-          <p:nvPr/>
-        </p:nvSpPr>
-        <p:spPr>
-          <a:xfrm>
-            <a:off x="11038162" y="3645947"/>
-            <a:ext cx="2344627" cy="812316"/>
-          </a:xfrm>
-          <a:prstGeom prst="leftUpArrow">
-            <a:avLst/>
-          </a:prstGeom>
-        </p:spPr>
-        <p:style>
-          <a:lnRef idx="2">
-            <a:schemeClr val="accent1">
-              <a:shade val="15000"/>
-            </a:schemeClr>
-          </a:lnRef>
-          <a:fillRef idx="1">
-            <a:schemeClr val="accent1"/>
-          </a:fillRef>
-          <a:effectRef idx="0">
-            <a:schemeClr val="accent1"/>
-          </a:effectRef>
-          <a:fontRef idx="minor">
-            <a:schemeClr val="lt1"/>
-          </a:fontRef>
-        </p:style>
-        <p:txBody>
-          <a:bodyPr rtlCol="0" anchor="ctr"/>
-          <a:lstStyle/>
-          <a:p>
-            <a:pPr algn="ctr"/>
-            <a:endParaRPr lang="en-IN"/>
-          </a:p>
-        </p:txBody>
-      </p:sp>
-      <p:sp>
-        <p:nvSpPr>
-          <p:cNvPr id="20" name="Arrow: Left-Up 19">
-            <a:extLst>
-              <a:ext uri="{FF2B5EF4-FFF2-40B4-BE49-F238E27FC236}">
-                <a16:creationId xmlns:a16="http://schemas.microsoft.com/office/drawing/2014/main" id="{8699FBEB-823E-99BE-CEC5-4D80857BF181}"/>
-              </a:ext>
-            </a:extLst>
-          </p:cNvPr>
-          <p:cNvSpPr/>
-          <p:nvPr/>
-        </p:nvSpPr>
-        <p:spPr>
-          <a:xfrm flipV="1">
-            <a:off x="11075961" y="4657100"/>
-            <a:ext cx="2344627" cy="846841"/>
-          </a:xfrm>
-          <a:prstGeom prst="leftUpArrow">
-            <a:avLst/>
-          </a:prstGeom>
-        </p:spPr>
-        <p:style>
-          <a:lnRef idx="2">
-            <a:schemeClr val="accent1">
-              <a:shade val="15000"/>
-            </a:schemeClr>
-          </a:lnRef>
-          <a:fillRef idx="1">
-            <a:schemeClr val="accent1"/>
-          </a:fillRef>
-          <a:effectRef idx="0">
-            <a:schemeClr val="accent1"/>
-          </a:effectRef>
-          <a:fontRef idx="minor">
-            <a:schemeClr val="lt1"/>
-          </a:fontRef>
-        </p:style>
-        <p:txBody>
-          <a:bodyPr rtlCol="0" anchor="ctr"/>
-          <a:lstStyle/>
-          <a:p>
-            <a:pPr algn="ctr"/>
-            <a:endParaRPr lang="en-IN"/>
-          </a:p>
-        </p:txBody>
-      </p:sp>
-      <p:sp>
-        <p:nvSpPr>
           <p:cNvPr id="21" name="Arrow: Down 20">
             <a:extLst>
               <a:ext uri="{FF2B5EF4-FFF2-40B4-BE49-F238E27FC236}">
@@ -7701,9 +7636,9 @@
           <p:nvPr/>
         </p:nvSpPr>
         <p:spPr>
-          <a:xfrm rot="5400000">
-            <a:off x="11300971" y="5439254"/>
-            <a:ext cx="472404" cy="922424"/>
+          <a:xfrm rot="16200000">
+            <a:off x="11277981" y="5416264"/>
+            <a:ext cx="472404" cy="968404"/>
           </a:xfrm>
           <a:prstGeom prst="downArrow">
             <a:avLst/>
@@ -7748,7 +7683,7 @@
         </p:nvSpPr>
         <p:spPr>
           <a:xfrm>
-            <a:off x="12827376" y="6391634"/>
+            <a:off x="12874093" y="6491681"/>
             <a:ext cx="593211" cy="632727"/>
           </a:xfrm>
           <a:prstGeom prst="downArrow">
@@ -7834,58 +7769,6 @@
       </p:sp>
       <p:sp>
         <p:nvSpPr>
-          <p:cNvPr id="26" name="Rectangle 25">
-            <a:extLst>
-              <a:ext uri="{FF2B5EF4-FFF2-40B4-BE49-F238E27FC236}">
-                <a16:creationId xmlns:a16="http://schemas.microsoft.com/office/drawing/2014/main" id="{981D9C5D-5781-D9E3-7E4E-B0E3E5E8AE88}"/>
-              </a:ext>
-            </a:extLst>
-          </p:cNvPr>
-          <p:cNvSpPr/>
-          <p:nvPr/>
-        </p:nvSpPr>
-        <p:spPr>
-          <a:xfrm>
-            <a:off x="5493348" y="5504695"/>
-            <a:ext cx="2344629" cy="947892"/>
-          </a:xfrm>
-          <a:prstGeom prst="rect">
-            <a:avLst/>
-          </a:prstGeom>
-        </p:spPr>
-        <p:style>
-          <a:lnRef idx="2">
-            <a:schemeClr val="accent1">
-              <a:shade val="15000"/>
-            </a:schemeClr>
-          </a:lnRef>
-          <a:fillRef idx="1">
-            <a:schemeClr val="accent1"/>
-          </a:fillRef>
-          <a:effectRef idx="0">
-            <a:schemeClr val="accent1"/>
-          </a:effectRef>
-          <a:fontRef idx="minor">
-            <a:schemeClr val="lt1"/>
-          </a:fontRef>
-        </p:style>
-        <p:txBody>
-          <a:bodyPr rtlCol="0" anchor="ctr"/>
-          <a:lstStyle/>
-          <a:p>
-            <a:pPr algn="ctr"/>
-            <a:r>
-              <a:rPr lang="en-IN" sz="1900" dirty="0">
-                <a:latin typeface="Times New Roman" panose="02020603050405020304" pitchFamily="18" charset="0"/>
-                <a:cs typeface="Times New Roman" panose="02020603050405020304" pitchFamily="18" charset="0"/>
-              </a:rPr>
-              <a:t>testing</a:t>
-            </a:r>
-          </a:p>
-        </p:txBody>
-      </p:sp>
-      <p:sp>
-        <p:nvSpPr>
           <p:cNvPr id="27" name="Rectangle 26">
             <a:extLst>
               <a:ext uri="{FF2B5EF4-FFF2-40B4-BE49-F238E27FC236}">
@@ -7898,7 +7781,7 @@
         </p:nvSpPr>
         <p:spPr>
           <a:xfrm>
-            <a:off x="8709190" y="5504694"/>
+            <a:off x="11998385" y="5534668"/>
             <a:ext cx="2344628" cy="927039"/>
           </a:xfrm>
           <a:prstGeom prst="rect">
@@ -7931,54 +7814,8 @@
                 <a:latin typeface="Times New Roman" panose="02020603050405020304" pitchFamily="18" charset="0"/>
                 <a:cs typeface="Times New Roman" panose="02020603050405020304" pitchFamily="18" charset="0"/>
               </a:rPr>
-              <a:t>classification</a:t>
+              <a:t>Classification</a:t>
             </a:r>
-          </a:p>
-        </p:txBody>
-      </p:sp>
-      <p:sp>
-        <p:nvSpPr>
-          <p:cNvPr id="28" name="Arrow: Down 27">
-            <a:extLst>
-              <a:ext uri="{FF2B5EF4-FFF2-40B4-BE49-F238E27FC236}">
-                <a16:creationId xmlns:a16="http://schemas.microsoft.com/office/drawing/2014/main" id="{67510878-8976-1189-75FE-AD1404924BC6}"/>
-              </a:ext>
-            </a:extLst>
-          </p:cNvPr>
-          <p:cNvSpPr/>
-          <p:nvPr/>
-        </p:nvSpPr>
-        <p:spPr>
-          <a:xfrm rot="5400000">
-            <a:off x="8044861" y="5553398"/>
-            <a:ext cx="472404" cy="808581"/>
-          </a:xfrm>
-          <a:prstGeom prst="downArrow">
-            <a:avLst/>
-          </a:prstGeom>
-        </p:spPr>
-        <p:style>
-          <a:lnRef idx="2">
-            <a:schemeClr val="accent1">
-              <a:shade val="15000"/>
-            </a:schemeClr>
-          </a:lnRef>
-          <a:fillRef idx="1">
-            <a:schemeClr val="accent1"/>
-          </a:fillRef>
-          <a:effectRef idx="0">
-            <a:schemeClr val="accent1"/>
-          </a:effectRef>
-          <a:fontRef idx="minor">
-            <a:schemeClr val="lt1"/>
-          </a:fontRef>
-        </p:style>
-        <p:txBody>
-          <a:bodyPr rtlCol="0" anchor="ctr"/>
-          <a:lstStyle/>
-          <a:p>
-            <a:pPr algn="ctr"/>
-            <a:endParaRPr lang="en-IN"/>
           </a:p>
         </p:txBody>
       </p:sp>
@@ -8015,6 +7852,248 @@
           </a:ln>
         </p:spPr>
       </p:pic>
+      <p:sp>
+        <p:nvSpPr>
+          <p:cNvPr id="8" name="Arrow: Bent-Up 7">
+            <a:extLst>
+              <a:ext uri="{FF2B5EF4-FFF2-40B4-BE49-F238E27FC236}">
+                <a16:creationId xmlns:a16="http://schemas.microsoft.com/office/drawing/2014/main" id="{6C98F0B1-E5DC-8451-6127-0451E76A9867}"/>
+              </a:ext>
+            </a:extLst>
+          </p:cNvPr>
+          <p:cNvSpPr/>
+          <p:nvPr/>
+        </p:nvSpPr>
+        <p:spPr>
+          <a:xfrm rot="10800000" flipH="1">
+            <a:off x="11029981" y="4611782"/>
+            <a:ext cx="2126173" cy="902988"/>
+          </a:xfrm>
+          <a:prstGeom prst="bentUpArrow">
+            <a:avLst/>
+          </a:prstGeom>
+        </p:spPr>
+        <p:style>
+          <a:lnRef idx="2">
+            <a:schemeClr val="accent1">
+              <a:shade val="15000"/>
+            </a:schemeClr>
+          </a:lnRef>
+          <a:fillRef idx="1">
+            <a:schemeClr val="accent1"/>
+          </a:fillRef>
+          <a:effectRef idx="0">
+            <a:schemeClr val="accent1"/>
+          </a:effectRef>
+          <a:fontRef idx="minor">
+            <a:schemeClr val="lt1"/>
+          </a:fontRef>
+        </p:style>
+        <p:txBody>
+          <a:bodyPr rtlCol="0" anchor="ctr"/>
+          <a:lstStyle/>
+          <a:p>
+            <a:pPr algn="ctr"/>
+            <a:endParaRPr lang="en-IN"/>
+          </a:p>
+        </p:txBody>
+      </p:sp>
+      <p:sp>
+        <p:nvSpPr>
+          <p:cNvPr id="9" name="Arrow: Bent-Up 8">
+            <a:extLst>
+              <a:ext uri="{FF2B5EF4-FFF2-40B4-BE49-F238E27FC236}">
+                <a16:creationId xmlns:a16="http://schemas.microsoft.com/office/drawing/2014/main" id="{FD35EB00-160A-A08F-EAA4-2226DB3236D7}"/>
+              </a:ext>
+            </a:extLst>
+          </p:cNvPr>
+          <p:cNvSpPr/>
+          <p:nvPr/>
+        </p:nvSpPr>
+        <p:spPr>
+          <a:xfrm rot="10800000" flipH="1" flipV="1">
+            <a:off x="11036061" y="3624043"/>
+            <a:ext cx="2088865" cy="774503"/>
+          </a:xfrm>
+          <a:prstGeom prst="bentUpArrow">
+            <a:avLst/>
+          </a:prstGeom>
+        </p:spPr>
+        <p:style>
+          <a:lnRef idx="2">
+            <a:schemeClr val="accent1">
+              <a:shade val="15000"/>
+            </a:schemeClr>
+          </a:lnRef>
+          <a:fillRef idx="1">
+            <a:schemeClr val="accent1"/>
+          </a:fillRef>
+          <a:effectRef idx="0">
+            <a:schemeClr val="accent1"/>
+          </a:effectRef>
+          <a:fontRef idx="minor">
+            <a:schemeClr val="lt1"/>
+          </a:fontRef>
+        </p:style>
+        <p:txBody>
+          <a:bodyPr rtlCol="0" anchor="ctr"/>
+          <a:lstStyle/>
+          <a:p>
+            <a:pPr algn="ctr"/>
+            <a:endParaRPr lang="en-IN"/>
+          </a:p>
+        </p:txBody>
+      </p:sp>
+      <p:sp>
+        <p:nvSpPr>
+          <p:cNvPr id="11" name="Rectangle 10">
+            <a:extLst>
+              <a:ext uri="{FF2B5EF4-FFF2-40B4-BE49-F238E27FC236}">
+                <a16:creationId xmlns:a16="http://schemas.microsoft.com/office/drawing/2014/main" id="{36AE9F9A-A4A8-2204-1BFC-3B57B6CC0E5F}"/>
+              </a:ext>
+            </a:extLst>
+          </p:cNvPr>
+          <p:cNvSpPr/>
+          <p:nvPr/>
+        </p:nvSpPr>
+        <p:spPr>
+          <a:xfrm>
+            <a:off x="5769595" y="5466949"/>
+            <a:ext cx="2253083" cy="886940"/>
+          </a:xfrm>
+          <a:prstGeom prst="rect">
+            <a:avLst/>
+          </a:prstGeom>
+        </p:spPr>
+        <p:style>
+          <a:lnRef idx="2">
+            <a:schemeClr val="accent1">
+              <a:shade val="15000"/>
+            </a:schemeClr>
+          </a:lnRef>
+          <a:fillRef idx="1">
+            <a:schemeClr val="accent1"/>
+          </a:fillRef>
+          <a:effectRef idx="0">
+            <a:schemeClr val="accent1"/>
+          </a:effectRef>
+          <a:fontRef idx="minor">
+            <a:schemeClr val="lt1"/>
+          </a:fontRef>
+        </p:style>
+        <p:txBody>
+          <a:bodyPr rtlCol="0" anchor="ctr"/>
+          <a:lstStyle/>
+          <a:p>
+            <a:pPr algn="ctr"/>
+            <a:r>
+              <a:rPr lang="en-IN" sz="1900" dirty="0">
+                <a:latin typeface="Times New Roman" panose="02020603050405020304" pitchFamily="18" charset="0"/>
+                <a:cs typeface="Times New Roman" panose="02020603050405020304" pitchFamily="18" charset="0"/>
+              </a:rPr>
+              <a:t>Data base</a:t>
+            </a:r>
+          </a:p>
+        </p:txBody>
+      </p:sp>
+      <p:sp>
+        <p:nvSpPr>
+          <p:cNvPr id="13" name="Rectangle 12">
+            <a:extLst>
+              <a:ext uri="{FF2B5EF4-FFF2-40B4-BE49-F238E27FC236}">
+                <a16:creationId xmlns:a16="http://schemas.microsoft.com/office/drawing/2014/main" id="{A2CE0515-DABB-AE11-2397-14604D0CA3C8}"/>
+              </a:ext>
+            </a:extLst>
+          </p:cNvPr>
+          <p:cNvSpPr/>
+          <p:nvPr/>
+        </p:nvSpPr>
+        <p:spPr>
+          <a:xfrm>
+            <a:off x="8745118" y="5466949"/>
+            <a:ext cx="2253083" cy="886940"/>
+          </a:xfrm>
+          <a:prstGeom prst="rect">
+            <a:avLst/>
+          </a:prstGeom>
+        </p:spPr>
+        <p:style>
+          <a:lnRef idx="2">
+            <a:schemeClr val="accent1">
+              <a:shade val="15000"/>
+            </a:schemeClr>
+          </a:lnRef>
+          <a:fillRef idx="1">
+            <a:schemeClr val="accent1"/>
+          </a:fillRef>
+          <a:effectRef idx="0">
+            <a:schemeClr val="accent1"/>
+          </a:effectRef>
+          <a:fontRef idx="minor">
+            <a:schemeClr val="lt1"/>
+          </a:fontRef>
+        </p:style>
+        <p:txBody>
+          <a:bodyPr rtlCol="0" anchor="ctr"/>
+          <a:lstStyle/>
+          <a:p>
+            <a:pPr algn="ctr"/>
+            <a:r>
+              <a:rPr lang="en-IN" sz="1900" dirty="0">
+                <a:latin typeface="Times New Roman" panose="02020603050405020304" pitchFamily="18" charset="0"/>
+                <a:cs typeface="Times New Roman" panose="02020603050405020304" pitchFamily="18" charset="0"/>
+              </a:rPr>
+              <a:t>Training Model</a:t>
+            </a:r>
+          </a:p>
+        </p:txBody>
+      </p:sp>
+      <p:sp>
+        <p:nvSpPr>
+          <p:cNvPr id="16" name="Arrow: Down 15">
+            <a:extLst>
+              <a:ext uri="{FF2B5EF4-FFF2-40B4-BE49-F238E27FC236}">
+                <a16:creationId xmlns:a16="http://schemas.microsoft.com/office/drawing/2014/main" id="{03909E62-7F4C-0820-1284-A1F14E3AADE0}"/>
+              </a:ext>
+            </a:extLst>
+          </p:cNvPr>
+          <p:cNvSpPr/>
+          <p:nvPr/>
+        </p:nvSpPr>
+        <p:spPr>
+          <a:xfrm rot="16200000">
+            <a:off x="8109851" y="5528506"/>
+            <a:ext cx="563985" cy="738328"/>
+          </a:xfrm>
+          <a:prstGeom prst="downArrow">
+            <a:avLst/>
+          </a:prstGeom>
+        </p:spPr>
+        <p:style>
+          <a:lnRef idx="2">
+            <a:schemeClr val="accent1">
+              <a:shade val="15000"/>
+            </a:schemeClr>
+          </a:lnRef>
+          <a:fillRef idx="1">
+            <a:schemeClr val="accent1"/>
+          </a:fillRef>
+          <a:effectRef idx="0">
+            <a:schemeClr val="accent1"/>
+          </a:effectRef>
+          <a:fontRef idx="minor">
+            <a:schemeClr val="lt1"/>
+          </a:fontRef>
+        </p:style>
+        <p:txBody>
+          <a:bodyPr rtlCol="0" anchor="ctr"/>
+          <a:lstStyle/>
+          <a:p>
+            <a:pPr algn="ctr"/>
+            <a:endParaRPr lang="en-IN"/>
+          </a:p>
+        </p:txBody>
+      </p:sp>
     </p:spTree>
   </p:cSld>
   <p:clrMapOvr>

</xml_diff>

<commit_message>
Added the new Docs
</commit_message>
<xml_diff>
--- a/PPT Competition edited.pptx
+++ b/PPT Competition edited.pptx
@@ -280,7 +280,7 @@
       <p15:sldGuideLst xmlns:p15="http://schemas.microsoft.com/office/powerpoint/2012/main"/>
     </p:ext>
     <p:ext uri="GoogleSlidesCustomDataVersion2">
-      <go:slidesCustomData xmlns="" xmlns:mc="http://schemas.openxmlformats.org/markup-compatibility/2006" xmlns:mv="urn:schemas-microsoft-com:mac:vml" xmlns:c="http://schemas.openxmlformats.org/drawingml/2006/chart" xmlns:dgm="http://schemas.openxmlformats.org/drawingml/2006/diagram" xmlns:o="urn:schemas-microsoft-com:office:office" xmlns:v="urn:schemas-microsoft-com:vml" xmlns:pvml="urn:schemas-microsoft-com:office:powerpoint" xmlns:com="http://schemas.openxmlformats.org/drawingml/2006/compatibility" xmlns:p14="http://schemas.microsoft.com/office/powerpoint/2010/main" xmlns:p15="http://schemas.microsoft.com/office/powerpoint/2012/main" xmlns:ahyp="http://schemas.microsoft.com/office/drawing/2018/hyperlinkcolor" xmlns:go="http://customooxmlschemas.google.com/" r:id="rId31" roundtripDataSignature="AMtx7mg3cm7Xvjkc6U0sK+jP/1ydJjPYVw=="/>
+      <go:slidesCustomData xmlns:go="http://customooxmlschemas.google.com/" xmlns:ahyp="http://schemas.microsoft.com/office/drawing/2018/hyperlinkcolor" xmlns:p15="http://schemas.microsoft.com/office/powerpoint/2012/main" xmlns:p14="http://schemas.microsoft.com/office/powerpoint/2010/main" xmlns:com="http://schemas.openxmlformats.org/drawingml/2006/compatibility" xmlns:pvml="urn:schemas-microsoft-com:office:powerpoint" xmlns:v="urn:schemas-microsoft-com:vml" xmlns:o="urn:schemas-microsoft-com:office:office" xmlns:dgm="http://schemas.openxmlformats.org/drawingml/2006/diagram" xmlns:c="http://schemas.openxmlformats.org/drawingml/2006/chart" xmlns:mv="urn:schemas-microsoft-com:mac:vml" xmlns:mc="http://schemas.openxmlformats.org/markup-compatibility/2006" xmlns="" r:id="rId31" roundtripDataSignature="AMtx7mg3cm7Xvjkc6U0sK+jP/1ydJjPYVw=="/>
     </p:ext>
   </p:extLst>
 </p:presentation>
@@ -5767,7 +5767,7 @@
                 <a:latin typeface="Times New Roman" panose="02020603050405020304" pitchFamily="18" charset="0"/>
                 <a:cs typeface="Times New Roman" panose="02020603050405020304" pitchFamily="18" charset="0"/>
               </a:rPr>
-              <a:t>Using Slider crank mechanism for Arm</a:t>
+              <a:t>Using Slider crank mechanism for Robotic Arm</a:t>
             </a:r>
           </a:p>
         </p:txBody>
@@ -6145,7 +6145,7 @@
         </p:nvSpPr>
         <p:spPr>
           <a:xfrm>
-            <a:off x="0" y="10578"/>
+            <a:off x="0" y="0"/>
             <a:ext cx="14630400" cy="8229600"/>
           </a:xfrm>
           <a:prstGeom prst="rect">
@@ -6547,7 +6547,7 @@
         </p:nvSpPr>
         <p:spPr>
           <a:xfrm>
-            <a:off x="8162339" y="3523421"/>
+            <a:off x="7945931" y="3487217"/>
             <a:ext cx="3003423" cy="1495663"/>
           </a:xfrm>
           <a:prstGeom prst="rect">
@@ -6599,8 +6599,8 @@
         </p:nvSpPr>
         <p:spPr>
           <a:xfrm>
-            <a:off x="4724842" y="3835960"/>
-            <a:ext cx="1702694" cy="870584"/>
+            <a:off x="8144653" y="5908819"/>
+            <a:ext cx="2640002" cy="1780402"/>
           </a:xfrm>
           <a:prstGeom prst="rect">
             <a:avLst/>
@@ -6632,111 +6632,7 @@
                 <a:latin typeface="Times New Roman" panose="02020603050405020304" pitchFamily="18" charset="0"/>
                 <a:cs typeface="Times New Roman" panose="02020603050405020304" pitchFamily="18" charset="0"/>
               </a:rPr>
-              <a:t>Motor Driver</a:t>
-            </a:r>
-          </a:p>
-        </p:txBody>
-      </p:sp>
-      <p:sp>
-        <p:nvSpPr>
-          <p:cNvPr id="4" name="Rectangle: Rounded Corners 3">
-            <a:extLst>
-              <a:ext uri="{FF2B5EF4-FFF2-40B4-BE49-F238E27FC236}">
-                <a16:creationId xmlns:a16="http://schemas.microsoft.com/office/drawing/2014/main" id="{78D427D7-4541-CD62-66B6-54E1A3F1748F}"/>
-              </a:ext>
-            </a:extLst>
-          </p:cNvPr>
-          <p:cNvSpPr/>
-          <p:nvPr/>
-        </p:nvSpPr>
-        <p:spPr>
-          <a:xfrm>
-            <a:off x="2986733" y="5646350"/>
-            <a:ext cx="1771650" cy="1055422"/>
-          </a:xfrm>
-          <a:prstGeom prst="roundRect">
-            <a:avLst/>
-          </a:prstGeom>
-        </p:spPr>
-        <p:style>
-          <a:lnRef idx="2">
-            <a:schemeClr val="accent1">
-              <a:shade val="15000"/>
-            </a:schemeClr>
-          </a:lnRef>
-          <a:fillRef idx="1">
-            <a:schemeClr val="accent1"/>
-          </a:fillRef>
-          <a:effectRef idx="0">
-            <a:schemeClr val="accent1"/>
-          </a:effectRef>
-          <a:fontRef idx="minor">
-            <a:schemeClr val="lt1"/>
-          </a:fontRef>
-        </p:style>
-        <p:txBody>
-          <a:bodyPr rtlCol="0" anchor="ctr"/>
-          <a:lstStyle/>
-          <a:p>
-            <a:pPr algn="ctr"/>
-            <a:r>
-              <a:rPr lang="en-IN" sz="2000" dirty="0">
-                <a:latin typeface="Times New Roman" panose="02020603050405020304" pitchFamily="18" charset="0"/>
-                <a:cs typeface="Times New Roman" panose="02020603050405020304" pitchFamily="18" charset="0"/>
-              </a:rPr>
-              <a:t>4 Motor for wheels</a:t>
-            </a:r>
-          </a:p>
-        </p:txBody>
-      </p:sp>
-      <p:sp>
-        <p:nvSpPr>
-          <p:cNvPr id="5" name="Rectangle: Rounded Corners 4">
-            <a:extLst>
-              <a:ext uri="{FF2B5EF4-FFF2-40B4-BE49-F238E27FC236}">
-                <a16:creationId xmlns:a16="http://schemas.microsoft.com/office/drawing/2014/main" id="{96120CBA-4909-B7B3-F830-42E8300DA1A7}"/>
-              </a:ext>
-            </a:extLst>
-          </p:cNvPr>
-          <p:cNvSpPr/>
-          <p:nvPr/>
-        </p:nvSpPr>
-        <p:spPr>
-          <a:xfrm>
-            <a:off x="6134794" y="5646350"/>
-            <a:ext cx="1771650" cy="1055422"/>
-          </a:xfrm>
-          <a:prstGeom prst="roundRect">
-            <a:avLst/>
-          </a:prstGeom>
-        </p:spPr>
-        <p:style>
-          <a:lnRef idx="2">
-            <a:schemeClr val="accent1">
-              <a:shade val="15000"/>
-            </a:schemeClr>
-          </a:lnRef>
-          <a:fillRef idx="1">
-            <a:schemeClr val="accent1"/>
-          </a:fillRef>
-          <a:effectRef idx="0">
-            <a:schemeClr val="accent1"/>
-          </a:effectRef>
-          <a:fontRef idx="minor">
-            <a:schemeClr val="lt1"/>
-          </a:fontRef>
-        </p:style>
-        <p:txBody>
-          <a:bodyPr rtlCol="0" anchor="ctr"/>
-          <a:lstStyle/>
-          <a:p>
-            <a:pPr algn="ctr"/>
-            <a:r>
-              <a:rPr lang="en-IN" sz="2000" dirty="0">
-                <a:latin typeface="Times New Roman" panose="02020603050405020304" pitchFamily="18" charset="0"/>
-                <a:cs typeface="Times New Roman" panose="02020603050405020304" pitchFamily="18" charset="0"/>
-              </a:rPr>
-              <a:t>Motor for planting mechanism.</a:t>
+              <a:t>Motor Controller (Controlling the action of robot and planting the seedlings with robotic arm)</a:t>
             </a:r>
           </a:p>
         </p:txBody>
@@ -6755,7 +6651,7 @@
         </p:nvSpPr>
         <p:spPr>
           <a:xfrm>
-            <a:off x="8704761" y="1773082"/>
+            <a:off x="8379005" y="1738347"/>
             <a:ext cx="1925139" cy="1121706"/>
           </a:xfrm>
           <a:prstGeom prst="ellipse">
@@ -6784,12 +6680,23 @@
           <a:p>
             <a:pPr algn="ctr"/>
             <a:r>
-              <a:rPr lang="en-IN" sz="2000" dirty="0">
+              <a:rPr lang="en-US" sz="2000" dirty="0">
                 <a:latin typeface="Times New Roman" panose="02020603050405020304" pitchFamily="18" charset="0"/>
                 <a:cs typeface="Times New Roman" panose="02020603050405020304" pitchFamily="18" charset="0"/>
               </a:rPr>
-              <a:t>Camera</a:t>
+              <a:t>S</a:t>
             </a:r>
+            <a:r>
+              <a:rPr lang="en-IN" sz="2000" dirty="0" err="1">
+                <a:latin typeface="Times New Roman" panose="02020603050405020304" pitchFamily="18" charset="0"/>
+                <a:cs typeface="Times New Roman" panose="02020603050405020304" pitchFamily="18" charset="0"/>
+              </a:rPr>
+              <a:t>ensors</a:t>
+            </a:r>
+            <a:endParaRPr lang="en-IN" sz="2000" dirty="0">
+              <a:latin typeface="Times New Roman" panose="02020603050405020304" pitchFamily="18" charset="0"/>
+              <a:cs typeface="Times New Roman" panose="02020603050405020304" pitchFamily="18" charset="0"/>
+            </a:endParaRPr>
           </a:p>
         </p:txBody>
       </p:sp>
@@ -6806,9 +6713,9 @@
           <p:nvPr/>
         </p:nvSpPr>
         <p:spPr>
-          <a:xfrm>
-            <a:off x="6738572" y="3995140"/>
-            <a:ext cx="1136697" cy="651510"/>
+          <a:xfrm rot="16200000">
+            <a:off x="8959367" y="5124776"/>
+            <a:ext cx="916575" cy="651510"/>
           </a:xfrm>
           <a:prstGeom prst="leftArrow">
             <a:avLst/>
@@ -6853,56 +6760,10 @@
         </p:nvSpPr>
         <p:spPr>
           <a:xfrm>
-            <a:off x="9424655" y="2977772"/>
+            <a:off x="9096932" y="2989759"/>
             <a:ext cx="628778" cy="461298"/>
           </a:xfrm>
           <a:prstGeom prst="downArrow">
-            <a:avLst/>
-          </a:prstGeom>
-        </p:spPr>
-        <p:style>
-          <a:lnRef idx="2">
-            <a:schemeClr val="accent1">
-              <a:shade val="15000"/>
-            </a:schemeClr>
-          </a:lnRef>
-          <a:fillRef idx="1">
-            <a:schemeClr val="accent1"/>
-          </a:fillRef>
-          <a:effectRef idx="0">
-            <a:schemeClr val="accent1"/>
-          </a:effectRef>
-          <a:fontRef idx="minor">
-            <a:schemeClr val="lt1"/>
-          </a:fontRef>
-        </p:style>
-        <p:txBody>
-          <a:bodyPr rtlCol="0" anchor="ctr"/>
-          <a:lstStyle/>
-          <a:p>
-            <a:pPr algn="ctr"/>
-            <a:endParaRPr lang="en-IN"/>
-          </a:p>
-        </p:txBody>
-      </p:sp>
-      <p:sp>
-        <p:nvSpPr>
-          <p:cNvPr id="14" name="Arrow: Left-Right-Up 13">
-            <a:extLst>
-              <a:ext uri="{FF2B5EF4-FFF2-40B4-BE49-F238E27FC236}">
-                <a16:creationId xmlns:a16="http://schemas.microsoft.com/office/drawing/2014/main" id="{576D0C8B-5E82-69C5-C1B3-24567A5C426C}"/>
-              </a:ext>
-            </a:extLst>
-          </p:cNvPr>
-          <p:cNvSpPr/>
-          <p:nvPr/>
-        </p:nvSpPr>
-        <p:spPr>
-          <a:xfrm>
-            <a:off x="4937760" y="4807758"/>
-            <a:ext cx="1040130" cy="1519102"/>
-          </a:xfrm>
-          <a:prstGeom prst="leftRightUpArrow">
             <a:avLst/>
           </a:prstGeom>
         </p:spPr>
@@ -7867,7 +7728,7 @@
         <p:spPr>
           <a:xfrm rot="10800000" flipH="1">
             <a:off x="11029981" y="4611782"/>
-            <a:ext cx="2126173" cy="902988"/>
+            <a:ext cx="2253083" cy="902988"/>
           </a:xfrm>
           <a:prstGeom prst="bentUpArrow">
             <a:avLst/>
@@ -7911,9 +7772,9 @@
           <p:nvPr/>
         </p:nvSpPr>
         <p:spPr>
-          <a:xfrm rot="10800000" flipH="1" flipV="1">
-            <a:off x="11036061" y="3624043"/>
-            <a:ext cx="2088865" cy="774503"/>
+          <a:xfrm rot="16200000" flipH="1">
+            <a:off x="11684190" y="3004787"/>
+            <a:ext cx="846840" cy="2126176"/>
           </a:xfrm>
           <a:prstGeom prst="bentUpArrow">
             <a:avLst/>
@@ -15345,7 +15206,13 @@
       </p:grpSpPr>
       <p:sp>
         <p:nvSpPr>
-          <p:cNvPr id="12" name="Google Shape;12;p1"/>
+          <p:cNvPr id="2" name="Google Shape;24;p2">
+            <a:extLst>
+              <a:ext uri="{FF2B5EF4-FFF2-40B4-BE49-F238E27FC236}">
+                <a16:creationId xmlns:a16="http://schemas.microsoft.com/office/drawing/2014/main" id="{039DF1E6-60B1-5538-F782-9B7911EB3F66}"/>
+              </a:ext>
+            </a:extLst>
+          </p:cNvPr>
           <p:cNvSpPr/>
           <p:nvPr/>
         </p:nvSpPr>
@@ -15365,37 +15232,21 @@
           </a:ln>
         </p:spPr>
         <p:txBody>
-          <a:bodyPr spcFirstLastPara="1" wrap="square" lIns="91425" tIns="45700" rIns="91425" bIns="45700" anchor="t" anchorCtr="0">
+          <a:bodyPr spcFirstLastPara="1" wrap="square" lIns="91425" tIns="91425" rIns="91425" bIns="91425" anchor="ctr" anchorCtr="0">
             <a:noAutofit/>
           </a:bodyPr>
           <a:lstStyle/>
           <a:p>
-            <a:pPr marL="0" marR="0" lvl="0" indent="0" algn="l" rtl="0">
-              <a:lnSpc>
-                <a:spcPct val="337500"/>
-              </a:lnSpc>
+            <a:pPr marL="0" lvl="0" indent="0" algn="l" rtl="0">
               <a:spcBef>
                 <a:spcPts val="0"/>
               </a:spcBef>
               <a:spcAft>
                 <a:spcPts val="0"/>
               </a:spcAft>
-              <a:buClr>
-                <a:schemeClr val="dk1"/>
-              </a:buClr>
-              <a:buSzPts val="1800"/>
-              <a:buFont typeface="Calibri"/>
               <a:buNone/>
             </a:pPr>
-            <a:endParaRPr sz="1800" b="0" i="0" u="none" strike="noStrike" cap="none">
-              <a:solidFill>
-                <a:schemeClr val="dk1"/>
-              </a:solidFill>
-              <a:latin typeface="Times New Roman"/>
-              <a:ea typeface="Times New Roman"/>
-              <a:cs typeface="Times New Roman"/>
-              <a:sym typeface="Times New Roman"/>
-            </a:endParaRPr>
+            <a:endParaRPr/>
           </a:p>
         </p:txBody>
       </p:sp>
@@ -15491,52 +15342,6 @@
       </p:sp>
       <p:sp>
         <p:nvSpPr>
-          <p:cNvPr id="14" name="Google Shape;14;p1"/>
-          <p:cNvSpPr/>
-          <p:nvPr/>
-        </p:nvSpPr>
-        <p:spPr>
-          <a:xfrm>
-            <a:off x="864037" y="6781205"/>
-            <a:ext cx="394930" cy="394930"/>
-          </a:xfrm>
-          <a:prstGeom prst="roundRect">
-            <a:avLst>
-              <a:gd name="adj" fmla="val 23151155"/>
-            </a:avLst>
-          </a:prstGeom>
-          <a:noFill/>
-          <a:ln w="9525" cap="flat" cmpd="sng">
-            <a:solidFill>
-              <a:srgbClr val="FFFFFF"/>
-            </a:solidFill>
-            <a:prstDash val="solid"/>
-            <a:round/>
-            <a:headEnd type="none" w="sm" len="sm"/>
-            <a:tailEnd type="none" w="sm" len="sm"/>
-          </a:ln>
-        </p:spPr>
-        <p:txBody>
-          <a:bodyPr spcFirstLastPara="1" wrap="square" lIns="91425" tIns="91425" rIns="91425" bIns="91425" anchor="ctr" anchorCtr="0">
-            <a:noAutofit/>
-          </a:bodyPr>
-          <a:lstStyle/>
-          <a:p>
-            <a:pPr marL="0" lvl="0" indent="0" algn="l" rtl="0">
-              <a:spcBef>
-                <a:spcPts val="0"/>
-              </a:spcBef>
-              <a:spcAft>
-                <a:spcPts val="0"/>
-              </a:spcAft>
-              <a:buNone/>
-            </a:pPr>
-            <a:endParaRPr/>
-          </a:p>
-        </p:txBody>
-      </p:sp>
-      <p:sp>
-        <p:nvSpPr>
           <p:cNvPr id="15" name="Google Shape;15;p1"/>
           <p:cNvSpPr/>
           <p:nvPr/>
@@ -15705,7 +15510,7 @@
               <a:buFont typeface="Calibri"/>
               <a:buNone/>
             </a:pPr>
-            <a:endParaRPr sz="2430" b="0" i="0" u="none" strike="noStrike" cap="none" dirty="0">
+            <a:endParaRPr sz="2430" b="1" i="0" u="none" strike="noStrike" cap="none" dirty="0">
               <a:solidFill>
                 <a:schemeClr val="dk1"/>
               </a:solidFill>

</xml_diff>